<commit_message>
distributes rows of table
</commit_message>
<xml_diff>
--- a/r-docker-cheatsheet/r-docker-cheatsheet.pptx
+++ b/r-docker-cheatsheet/r-docker-cheatsheet.pptx
@@ -2986,14 +2986,14 @@
           <p:nvPr>
             <p:extLst>
               <p:ext uri="{D42A27DB-BD31-4B8C-83A1-F6EECF244321}">
-                <p14:modId xmlns:p14="http://schemas.microsoft.com/office/powerpoint/2010/main" val="3203306043"/>
+                <p14:modId xmlns:p14="http://schemas.microsoft.com/office/powerpoint/2010/main" val="1376834593"/>
               </p:ext>
             </p:extLst>
           </p:nvPr>
         </p:nvGraphicFramePr>
         <p:xfrm>
           <a:off x="3303838" y="3524667"/>
-          <a:ext cx="6360396" cy="1701712"/>
+          <a:ext cx="6360396" cy="1701711"/>
         </p:xfrm>
         <a:graphic>
           <a:graphicData uri="http://schemas.openxmlformats.org/drawingml/2006/table">
@@ -3617,7 +3617,7 @@
                   </a:ext>
                 </a:extLst>
               </a:tr>
-              <a:tr h="421500">
+              <a:tr h="379723">
                 <a:tc>
                   <a:txBody>
                     <a:bodyPr/>
@@ -3857,7 +3857,7 @@
                   </a:ext>
                 </a:extLst>
               </a:tr>
-              <a:tr h="358835">
+              <a:tr h="379723">
                 <a:tc>
                   <a:txBody>
                     <a:bodyPr/>
@@ -4124,7 +4124,7 @@
                   </a:ext>
                 </a:extLst>
               </a:tr>
-              <a:tr h="358835">
+              <a:tr h="379723">
                 <a:tc>
                   <a:txBody>
                     <a:bodyPr/>

</xml_diff>